<commit_message>
Slight change in the PTM tutorial.
git-svn-id: http://dminfo:8686/svn/repository/models/branches/dsm2_distribute_v8_0@1522 cdc4813b-4270-ec4f-936e-925f93a782c2

Former-commit-id: 8c6912b43e1844d2a011d15914816c29cd85c494
</commit_message>
<xml_diff>
--- a/dsm2/presentations/DSM2_PTM.pptx
+++ b/dsm2/presentations/DSM2_PTM.pptx
@@ -4586,27 +4586,37 @@
           <a:lstStyle/>
           <a:p>
             <a:r>
+              <a:rPr lang="en-US" sz="1800" dirty="0" smtClean="0">
+                <a:solidFill>
+                  <a:schemeClr val="bg2"/>
+                </a:solidFill>
+              </a:rPr>
+              <a:t>Particle</a:t>
+            </a:r>
+            <a:endParaRPr lang="en-US" sz="1800" dirty="0" smtClean="0">
+              <a:solidFill>
+                <a:schemeClr val="bg2"/>
+              </a:solidFill>
+            </a:endParaRPr>
+          </a:p>
+          <a:p>
+            <a:r>
+              <a:rPr lang="en-US" sz="1800" dirty="0" smtClean="0">
+                <a:solidFill>
+                  <a:schemeClr val="bg2"/>
+                </a:solidFill>
+              </a:rPr>
+              <a:t>Release:</a:t>
+            </a:r>
+          </a:p>
+          <a:p>
+            <a:r>
               <a:rPr lang="en-US" sz="1800" dirty="0" err="1" smtClean="0">
                 <a:solidFill>
                   <a:schemeClr val="bg2"/>
                 </a:solidFill>
               </a:rPr>
-              <a:t>Mossdale:Particle</a:t>
-            </a:r>
-            <a:endParaRPr lang="en-US" sz="1800" dirty="0" smtClean="0">
-              <a:solidFill>
-                <a:schemeClr val="bg2"/>
-              </a:solidFill>
-            </a:endParaRPr>
-          </a:p>
-          <a:p>
-            <a:r>
-              <a:rPr lang="en-US" sz="1800" dirty="0" smtClean="0">
-                <a:solidFill>
-                  <a:schemeClr val="bg2"/>
-                </a:solidFill>
-              </a:rPr>
-              <a:t>Release</a:t>
+              <a:t>Mossdale</a:t>
             </a:r>
             <a:endParaRPr lang="en-US" sz="1800" dirty="0">
               <a:solidFill>
@@ -4709,8 +4719,13 @@
                   <a:schemeClr val="bg2"/>
                 </a:solidFill>
               </a:rPr>
-              <a:t>Martinez:</a:t>
-            </a:r>
+              <a:t>Flux:</a:t>
+            </a:r>
+            <a:endParaRPr lang="en-US" sz="1800" dirty="0" smtClean="0">
+              <a:solidFill>
+                <a:schemeClr val="bg2"/>
+              </a:solidFill>
+            </a:endParaRPr>
           </a:p>
           <a:p>
             <a:r>
@@ -4719,7 +4734,7 @@
                   <a:schemeClr val="bg2"/>
                 </a:solidFill>
               </a:rPr>
-              <a:t>Flux</a:t>
+              <a:t>Martinez</a:t>
             </a:r>
             <a:endParaRPr lang="en-US" sz="1800" dirty="0">
               <a:solidFill>
@@ -4731,20 +4746,121 @@
       </p:sp>
       <p:sp>
         <p:nvSpPr>
-          <p:cNvPr id="13" name="Down Arrow 12"/>
+          <p:cNvPr id="15" name="TextBox 14"/>
+          <p:cNvSpPr txBox="1"/>
+          <p:nvPr/>
+        </p:nvSpPr>
+        <p:spPr>
+          <a:xfrm>
+            <a:off x="2892437" y="5498971"/>
+            <a:ext cx="1362193" cy="646331"/>
+          </a:xfrm>
+          <a:prstGeom prst="rect">
+            <a:avLst/>
+          </a:prstGeom>
+          <a:solidFill>
+            <a:schemeClr val="tx1"/>
+          </a:solidFill>
+        </p:spPr>
+        <p:txBody>
+          <a:bodyPr wrap="square" rtlCol="0">
+            <a:spAutoFit/>
+          </a:bodyPr>
+          <a:lstStyle/>
+          <a:p>
+            <a:r>
+              <a:rPr lang="en-US" sz="1800" dirty="0" smtClean="0">
+                <a:solidFill>
+                  <a:schemeClr val="bg2"/>
+                </a:solidFill>
+              </a:rPr>
+              <a:t>Flux: SWP </a:t>
+            </a:r>
+            <a:r>
+              <a:rPr lang="en-US" sz="1800" dirty="0" smtClean="0">
+                <a:solidFill>
+                  <a:schemeClr val="bg2"/>
+                </a:solidFill>
+              </a:rPr>
+              <a:t>&amp; </a:t>
+            </a:r>
+            <a:r>
+              <a:rPr lang="en-US" sz="1800" dirty="0" smtClean="0">
+                <a:solidFill>
+                  <a:schemeClr val="bg2"/>
+                </a:solidFill>
+              </a:rPr>
+              <a:t>CVP</a:t>
+            </a:r>
+            <a:endParaRPr lang="en-US" sz="1800" dirty="0">
+              <a:solidFill>
+                <a:schemeClr val="bg2"/>
+              </a:solidFill>
+            </a:endParaRPr>
+          </a:p>
+        </p:txBody>
+      </p:sp>
+      <p:sp>
+        <p:nvSpPr>
+          <p:cNvPr id="16" name="TextBox 15"/>
+          <p:cNvSpPr txBox="1"/>
+          <p:nvPr/>
+        </p:nvSpPr>
+        <p:spPr>
+          <a:xfrm>
+            <a:off x="3110824" y="1483409"/>
+            <a:ext cx="1362193" cy="646331"/>
+          </a:xfrm>
+          <a:prstGeom prst="rect">
+            <a:avLst/>
+          </a:prstGeom>
+          <a:solidFill>
+            <a:schemeClr val="tx1"/>
+          </a:solidFill>
+        </p:spPr>
+        <p:txBody>
+          <a:bodyPr wrap="square" rtlCol="0">
+            <a:spAutoFit/>
+          </a:bodyPr>
+          <a:lstStyle/>
+          <a:p>
+            <a:r>
+              <a:rPr lang="en-US" sz="1800" dirty="0" smtClean="0">
+                <a:solidFill>
+                  <a:schemeClr val="bg2"/>
+                </a:solidFill>
+              </a:rPr>
+              <a:t>Group:</a:t>
+            </a:r>
+          </a:p>
+          <a:p>
+            <a:r>
+              <a:rPr lang="en-US" sz="1800" dirty="0" smtClean="0">
+                <a:solidFill>
+                  <a:schemeClr val="bg2"/>
+                </a:solidFill>
+              </a:rPr>
+              <a:t>In-Delta</a:t>
+            </a:r>
+          </a:p>
+        </p:txBody>
+      </p:sp>
+      <p:sp>
+        <p:nvSpPr>
+          <p:cNvPr id="17" name="Down Arrow 16"/>
           <p:cNvSpPr/>
           <p:nvPr/>
         </p:nvSpPr>
         <p:spPr bwMode="auto">
-          <a:xfrm rot="2961339">
-            <a:off x="4676018" y="5404192"/>
-            <a:ext cx="420471" cy="771426"/>
+          <a:xfrm rot="6802455">
+            <a:off x="3423501" y="4017387"/>
+            <a:ext cx="565608" cy="754144"/>
           </a:xfrm>
           <a:prstGeom prst="downArrow">
             <a:avLst/>
           </a:prstGeom>
           <a:solidFill>
-            <a:srgbClr val="C00000"/>
+            <a:schemeClr val="bg1"/>
           </a:solidFill>
           <a:ln w="9525" cap="flat" cmpd="sng" algn="ctr">
             <a:noFill/>
@@ -4794,24 +4910,87 @@
       </p:sp>
       <p:sp>
         <p:nvSpPr>
-          <p:cNvPr id="14" name="Down Arrow 13"/>
-          <p:cNvSpPr/>
+          <p:cNvPr id="20" name="TextBox 19"/>
+          <p:cNvSpPr txBox="1"/>
           <p:nvPr/>
         </p:nvSpPr>
-        <p:spPr bwMode="auto">
-          <a:xfrm rot="2961339">
-            <a:off x="4451345" y="5104104"/>
-            <a:ext cx="420471" cy="771426"/>
+        <p:spPr>
+          <a:xfrm>
+            <a:off x="3393649" y="4675695"/>
+            <a:ext cx="1228627" cy="668329"/>
           </a:xfrm>
-          <a:prstGeom prst="downArrow">
+          <a:prstGeom prst="rect">
             <a:avLst/>
           </a:prstGeom>
           <a:solidFill>
-            <a:srgbClr val="C00000"/>
+            <a:schemeClr val="tx1"/>
           </a:solidFill>
-          <a:ln w="9525" cap="flat" cmpd="sng" algn="ctr">
-            <a:noFill/>
-            <a:prstDash val="solid"/>
+        </p:spPr>
+        <p:txBody>
+          <a:bodyPr wrap="square" rtlCol="0">
+            <a:spAutoFit/>
+          </a:bodyPr>
+          <a:lstStyle/>
+          <a:p>
+            <a:r>
+              <a:rPr lang="en-US" sz="1800" dirty="0" smtClean="0">
+                <a:solidFill>
+                  <a:schemeClr val="bg2"/>
+                </a:solidFill>
+              </a:rPr>
+              <a:t>Flux</a:t>
+            </a:r>
+            <a:r>
+              <a:rPr lang="en-US" sz="1800" dirty="0" smtClean="0">
+                <a:solidFill>
+                  <a:schemeClr val="bg2"/>
+                </a:solidFill>
+              </a:rPr>
+              <a:t>:</a:t>
+            </a:r>
+            <a:endParaRPr lang="en-US" sz="1800" dirty="0" smtClean="0">
+              <a:solidFill>
+                <a:schemeClr val="bg2"/>
+              </a:solidFill>
+            </a:endParaRPr>
+          </a:p>
+          <a:p>
+            <a:r>
+              <a:rPr lang="en-US" sz="1800" dirty="0" err="1" smtClean="0">
+                <a:solidFill>
+                  <a:schemeClr val="bg2"/>
+                </a:solidFill>
+              </a:rPr>
+              <a:t>Chipps</a:t>
+            </a:r>
+            <a:endParaRPr lang="en-US" sz="1800" dirty="0">
+              <a:solidFill>
+                <a:schemeClr val="bg2"/>
+              </a:solidFill>
+            </a:endParaRPr>
+          </a:p>
+        </p:txBody>
+      </p:sp>
+      <p:sp>
+        <p:nvSpPr>
+          <p:cNvPr id="21" name="Oval 20"/>
+          <p:cNvSpPr/>
+          <p:nvPr/>
+        </p:nvSpPr>
+        <p:spPr bwMode="auto">
+          <a:xfrm>
+            <a:off x="4901938" y="3912123"/>
+            <a:ext cx="452486" cy="358219"/>
+          </a:xfrm>
+          <a:prstGeom prst="ellipse">
+            <a:avLst/>
+          </a:prstGeom>
+          <a:noFill/>
+          <a:ln w="34925" cap="flat" cmpd="sng" algn="ctr">
+            <a:solidFill>
+              <a:schemeClr val="tx1"/>
+            </a:solidFill>
+            <a:prstDash val="sysDot"/>
             <a:round/>
             <a:headEnd type="none" w="med" len="med"/>
             <a:tailEnd type="none" w="med" len="med"/>
@@ -4857,13 +5036,13 @@
       </p:sp>
       <p:sp>
         <p:nvSpPr>
-          <p:cNvPr id="15" name="TextBox 14"/>
+          <p:cNvPr id="22" name="TextBox 21"/>
           <p:cNvSpPr txBox="1"/>
           <p:nvPr/>
         </p:nvSpPr>
         <p:spPr>
           <a:xfrm>
-            <a:off x="2892437" y="5498971"/>
+            <a:off x="6270375" y="2917854"/>
             <a:ext cx="1362193" cy="646331"/>
           </a:xfrm>
           <a:prstGeom prst="rect">
@@ -4885,39 +5064,9 @@
                   <a:schemeClr val="bg2"/>
                 </a:solidFill>
               </a:rPr>
-              <a:t>SWP &amp; CVP: Flux</a:t>
-            </a:r>
-            <a:endParaRPr lang="en-US" sz="1800" dirty="0">
-              <a:solidFill>
-                <a:schemeClr val="bg2"/>
-              </a:solidFill>
-            </a:endParaRPr>
-          </a:p>
-        </p:txBody>
-      </p:sp>
-      <p:sp>
-        <p:nvSpPr>
-          <p:cNvPr id="16" name="TextBox 15"/>
-          <p:cNvSpPr txBox="1"/>
-          <p:nvPr/>
-        </p:nvSpPr>
-        <p:spPr>
-          <a:xfrm>
-            <a:off x="3110824" y="1483409"/>
-            <a:ext cx="1362193" cy="646331"/>
-          </a:xfrm>
-          <a:prstGeom prst="rect">
-            <a:avLst/>
-          </a:prstGeom>
-          <a:solidFill>
-            <a:schemeClr val="tx1"/>
-          </a:solidFill>
-        </p:spPr>
-        <p:txBody>
-          <a:bodyPr wrap="square" rtlCol="0">
-            <a:spAutoFit/>
-          </a:bodyPr>
-          <a:lstStyle/>
+              <a:t>Group:</a:t>
+            </a:r>
+          </a:p>
           <a:p>
             <a:r>
               <a:rPr lang="en-US" sz="1800" dirty="0" smtClean="0">
@@ -4925,18 +5074,204 @@
                   <a:schemeClr val="bg2"/>
                 </a:solidFill>
               </a:rPr>
-              <a:t>Group:</a:t>
-            </a:r>
-          </a:p>
-          <a:p>
-            <a:r>
-              <a:rPr lang="en-US" sz="1800" dirty="0" smtClean="0">
-                <a:solidFill>
-                  <a:schemeClr val="bg2"/>
-                </a:solidFill>
-              </a:rPr>
-              <a:t>In-Delta</a:t>
-            </a:r>
+              <a:t>Franks</a:t>
+            </a:r>
+            <a:endParaRPr lang="en-US" sz="1800" dirty="0" smtClean="0">
+              <a:solidFill>
+                <a:schemeClr val="bg2"/>
+              </a:solidFill>
+            </a:endParaRPr>
+          </a:p>
+        </p:txBody>
+      </p:sp>
+      <p:sp>
+        <p:nvSpPr>
+          <p:cNvPr id="23" name="Down Arrow 22"/>
+          <p:cNvSpPr/>
+          <p:nvPr/>
+        </p:nvSpPr>
+        <p:spPr bwMode="auto">
+          <a:xfrm rot="2844549">
+            <a:off x="4497284" y="5195023"/>
+            <a:ext cx="405745" cy="754144"/>
+          </a:xfrm>
+          <a:prstGeom prst="downArrow">
+            <a:avLst/>
+          </a:prstGeom>
+          <a:solidFill>
+            <a:schemeClr val="bg1"/>
+          </a:solidFill>
+          <a:ln w="9525" cap="flat" cmpd="sng" algn="ctr">
+            <a:noFill/>
+            <a:prstDash val="solid"/>
+            <a:round/>
+            <a:headEnd type="none" w="med" len="med"/>
+            <a:tailEnd type="none" w="med" len="med"/>
+          </a:ln>
+          <a:effectLst/>
+        </p:spPr>
+        <p:txBody>
+          <a:bodyPr vert="horz" wrap="square" lIns="91440" tIns="45720" rIns="91440" bIns="45720" numCol="1" rtlCol="0" anchor="ctr" anchorCtr="0" compatLnSpc="1">
+            <a:prstTxWarp prst="textNoShape">
+              <a:avLst/>
+            </a:prstTxWarp>
+          </a:bodyPr>
+          <a:lstStyle/>
+          <a:p>
+            <a:pPr marL="0" marR="0" indent="0" algn="ctr" defTabSz="914400" rtl="0" eaLnBrk="0" fontAlgn="base" latinLnBrk="0" hangingPunct="0">
+              <a:lnSpc>
+                <a:spcPct val="100000"/>
+              </a:lnSpc>
+              <a:spcBef>
+                <a:spcPct val="0"/>
+              </a:spcBef>
+              <a:spcAft>
+                <a:spcPct val="0"/>
+              </a:spcAft>
+              <a:buClrTx/>
+              <a:buSzTx/>
+              <a:buFontTx/>
+              <a:buNone/>
+              <a:tabLst/>
+            </a:pPr>
+            <a:endParaRPr kumimoji="0" lang="en-US" sz="3600" b="1" i="0" u="none" strike="noStrike" cap="none" normalizeH="0" baseline="0" smtClean="0">
+              <a:ln>
+                <a:noFill/>
+              </a:ln>
+              <a:solidFill>
+                <a:schemeClr val="tx1"/>
+              </a:solidFill>
+              <a:effectLst/>
+              <a:latin typeface="Arial" charset="0"/>
+            </a:endParaRPr>
+          </a:p>
+        </p:txBody>
+      </p:sp>
+      <p:sp>
+        <p:nvSpPr>
+          <p:cNvPr id="24" name="Down Arrow 23"/>
+          <p:cNvSpPr/>
+          <p:nvPr/>
+        </p:nvSpPr>
+        <p:spPr bwMode="auto">
+          <a:xfrm rot="2844549">
+            <a:off x="4715672" y="5460544"/>
+            <a:ext cx="405745" cy="754144"/>
+          </a:xfrm>
+          <a:prstGeom prst="downArrow">
+            <a:avLst/>
+          </a:prstGeom>
+          <a:solidFill>
+            <a:schemeClr val="bg1"/>
+          </a:solidFill>
+          <a:ln w="9525" cap="flat" cmpd="sng" algn="ctr">
+            <a:noFill/>
+            <a:prstDash val="solid"/>
+            <a:round/>
+            <a:headEnd type="none" w="med" len="med"/>
+            <a:tailEnd type="none" w="med" len="med"/>
+          </a:ln>
+          <a:effectLst/>
+        </p:spPr>
+        <p:txBody>
+          <a:bodyPr vert="horz" wrap="square" lIns="91440" tIns="45720" rIns="91440" bIns="45720" numCol="1" rtlCol="0" anchor="ctr" anchorCtr="0" compatLnSpc="1">
+            <a:prstTxWarp prst="textNoShape">
+              <a:avLst/>
+            </a:prstTxWarp>
+          </a:bodyPr>
+          <a:lstStyle/>
+          <a:p>
+            <a:pPr marL="0" marR="0" indent="0" algn="ctr" defTabSz="914400" rtl="0" eaLnBrk="0" fontAlgn="base" latinLnBrk="0" hangingPunct="0">
+              <a:lnSpc>
+                <a:spcPct val="100000"/>
+              </a:lnSpc>
+              <a:spcBef>
+                <a:spcPct val="0"/>
+              </a:spcBef>
+              <a:spcAft>
+                <a:spcPct val="0"/>
+              </a:spcAft>
+              <a:buClrTx/>
+              <a:buSzTx/>
+              <a:buFontTx/>
+              <a:buNone/>
+              <a:tabLst/>
+            </a:pPr>
+            <a:endParaRPr kumimoji="0" lang="en-US" sz="3600" b="1" i="0" u="none" strike="noStrike" cap="none" normalizeH="0" baseline="0" smtClean="0">
+              <a:ln>
+                <a:noFill/>
+              </a:ln>
+              <a:solidFill>
+                <a:schemeClr val="tx1"/>
+              </a:solidFill>
+              <a:effectLst/>
+              <a:latin typeface="Arial" charset="0"/>
+            </a:endParaRPr>
+          </a:p>
+        </p:txBody>
+      </p:sp>
+      <p:sp>
+        <p:nvSpPr>
+          <p:cNvPr id="25" name="Down Arrow 24"/>
+          <p:cNvSpPr/>
+          <p:nvPr/>
+        </p:nvSpPr>
+        <p:spPr bwMode="auto">
+          <a:xfrm rot="3224967">
+            <a:off x="5634069" y="3365024"/>
+            <a:ext cx="226256" cy="754144"/>
+          </a:xfrm>
+          <a:prstGeom prst="downArrow">
+            <a:avLst/>
+          </a:prstGeom>
+          <a:solidFill>
+            <a:schemeClr val="accent1">
+              <a:lumMod val="75000"/>
+            </a:schemeClr>
+          </a:solidFill>
+          <a:ln w="9525" cap="flat" cmpd="sng" algn="ctr">
+            <a:noFill/>
+            <a:prstDash val="solid"/>
+            <a:round/>
+            <a:headEnd type="none" w="med" len="med"/>
+            <a:tailEnd type="none" w="med" len="med"/>
+          </a:ln>
+          <a:effectLst/>
+        </p:spPr>
+        <p:txBody>
+          <a:bodyPr vert="horz" wrap="square" lIns="91440" tIns="45720" rIns="91440" bIns="45720" numCol="1" rtlCol="0" anchor="ctr" anchorCtr="0" compatLnSpc="1">
+            <a:prstTxWarp prst="textNoShape">
+              <a:avLst/>
+            </a:prstTxWarp>
+          </a:bodyPr>
+          <a:lstStyle/>
+          <a:p>
+            <a:pPr marL="0" marR="0" indent="0" algn="ctr" defTabSz="914400" rtl="0" eaLnBrk="0" fontAlgn="base" latinLnBrk="0" hangingPunct="0">
+              <a:lnSpc>
+                <a:spcPct val="100000"/>
+              </a:lnSpc>
+              <a:spcBef>
+                <a:spcPct val="0"/>
+              </a:spcBef>
+              <a:spcAft>
+                <a:spcPct val="0"/>
+              </a:spcAft>
+              <a:buClrTx/>
+              <a:buSzTx/>
+              <a:buFontTx/>
+              <a:buNone/>
+              <a:tabLst/>
+            </a:pPr>
+            <a:endParaRPr kumimoji="0" lang="en-US" sz="3600" b="1" i="0" u="none" strike="noStrike" cap="none" normalizeH="0" baseline="0" smtClean="0">
+              <a:ln>
+                <a:noFill/>
+              </a:ln>
+              <a:solidFill>
+                <a:schemeClr val="tx1"/>
+              </a:solidFill>
+              <a:effectLst/>
+              <a:latin typeface="Arial" charset="0"/>
+            </a:endParaRPr>
           </a:p>
         </p:txBody>
       </p:sp>
@@ -5041,7 +5376,7 @@
       </p:sp>
       <p:pic>
         <p:nvPicPr>
-          <p:cNvPr id="4098" name="Picture 2"/>
+          <p:cNvPr id="21508" name="Picture 4"/>
           <p:cNvPicPr>
             <a:picLocks noChangeAspect="1" noChangeArrowheads="1"/>
           </p:cNvPicPr>
@@ -5056,19 +5391,22 @@
         </p:blipFill>
         <p:spPr bwMode="auto">
           <a:xfrm>
-            <a:off x="1840230" y="1806575"/>
-            <a:ext cx="5807393" cy="4822139"/>
+            <a:off x="1329178" y="1514357"/>
+            <a:ext cx="6615227" cy="5145679"/>
           </a:xfrm>
           <a:prstGeom prst="rect">
             <a:avLst/>
           </a:prstGeom>
-          <a:noFill/>
+          <a:solidFill>
+            <a:schemeClr val="tx1"/>
+          </a:solidFill>
           <a:ln w="9525">
             <a:noFill/>
             <a:miter lim="800000"/>
             <a:headEnd/>
             <a:tailEnd/>
           </a:ln>
+          <a:effectLst/>
         </p:spPr>
       </p:pic>
     </p:spTree>
@@ -5650,11 +5988,7 @@
             </a:r>
             <a:r>
               <a:rPr lang="en-US" smtClean="0"/>
-              <a:t>discrete </a:t>
-            </a:r>
-            <a:r>
-              <a:rPr lang="en-US" smtClean="0"/>
-              <a:t>matter </a:t>
+              <a:t>discrete matter </a:t>
             </a:r>
             <a:r>
               <a:rPr lang="en-US" dirty="0" smtClean="0"/>
@@ -5675,37 +6009,21 @@
             </a:pPr>
             <a:r>
               <a:rPr lang="en-US" sz="3200" dirty="0" smtClean="0"/>
-              <a:t>Substitute of contaminant </a:t>
-            </a:r>
-            <a:r>
-              <a:rPr lang="en-US" sz="3200" dirty="0" smtClean="0"/>
-              <a:t>modeling</a:t>
+              <a:t>Substitute of contaminant modeling</a:t>
             </a:r>
           </a:p>
           <a:p>
             <a:pPr marL="742950" lvl="2" indent="-342900"/>
             <a:r>
               <a:rPr lang="en-US" dirty="0" smtClean="0"/>
-              <a:t>Intuitive </a:t>
-            </a:r>
+              <a:t>Intuitive and simple (faster)</a:t>
+            </a:r>
+          </a:p>
+          <a:p>
+            <a:pPr marL="742950" lvl="2" indent="-342900"/>
             <a:r>
               <a:rPr lang="en-US" dirty="0" smtClean="0"/>
-              <a:t>and simple (</a:t>
-            </a:r>
-            <a:r>
-              <a:rPr lang="en-US" dirty="0" smtClean="0"/>
-              <a:t>faster)</a:t>
-            </a:r>
-          </a:p>
-          <a:p>
-            <a:pPr marL="742950" lvl="2" indent="-342900"/>
-            <a:r>
-              <a:rPr lang="en-US" dirty="0" smtClean="0"/>
-              <a:t>Not </a:t>
-            </a:r>
-            <a:r>
-              <a:rPr lang="en-US" dirty="0" smtClean="0"/>
-              <a:t>suffered from numerical oscillation problems</a:t>
+              <a:t>Not suffered from numerical oscillation problems</a:t>
             </a:r>
           </a:p>
         </p:txBody>

</xml_diff>